<commit_message>
Added Video and Conclusion
</commit_message>
<xml_diff>
--- a/Project_Slides_final.pptx
+++ b/Project_Slides_final.pptx
@@ -13,7 +13,7 @@
     <p:sldId id="260" r:id="rId7"/>
   </p:sldIdLst>
   <p:sldSz cx="9144000" cy="6858000" type="screen4x3"/>
-  <p:notesSz cx="6858000" cy="9144000"/>
+  <p:notesSz cx="7315200" cy="9601200"/>
   <p:defaultTextStyle>
     <a:defPPr>
       <a:defRPr lang="en-US"/>
@@ -248,7 +248,7 @@
           <a:p>
             <a:fld id="{1ED510AF-F9B4-4E1A-954B-380C51C6E72A}" type="datetimeFigureOut">
               <a:rPr lang="en-US" smtClean="0"/>
-              <a:t>12/6/18</a:t>
+              <a:t>12/7/2018</a:t>
             </a:fld>
             <a:endParaRPr lang="en-US"/>
           </a:p>
@@ -418,7 +418,7 @@
           <a:p>
             <a:fld id="{1ED510AF-F9B4-4E1A-954B-380C51C6E72A}" type="datetimeFigureOut">
               <a:rPr lang="en-US" smtClean="0"/>
-              <a:t>12/6/18</a:t>
+              <a:t>12/7/2018</a:t>
             </a:fld>
             <a:endParaRPr lang="en-US"/>
           </a:p>
@@ -598,7 +598,7 @@
           <a:p>
             <a:fld id="{1ED510AF-F9B4-4E1A-954B-380C51C6E72A}" type="datetimeFigureOut">
               <a:rPr lang="en-US" smtClean="0"/>
-              <a:t>12/6/18</a:t>
+              <a:t>12/7/2018</a:t>
             </a:fld>
             <a:endParaRPr lang="en-US"/>
           </a:p>
@@ -768,7 +768,7 @@
           <a:p>
             <a:fld id="{1ED510AF-F9B4-4E1A-954B-380C51C6E72A}" type="datetimeFigureOut">
               <a:rPr lang="en-US" smtClean="0"/>
-              <a:t>12/6/18</a:t>
+              <a:t>12/7/2018</a:t>
             </a:fld>
             <a:endParaRPr lang="en-US"/>
           </a:p>
@@ -1012,7 +1012,7 @@
           <a:p>
             <a:fld id="{1ED510AF-F9B4-4E1A-954B-380C51C6E72A}" type="datetimeFigureOut">
               <a:rPr lang="en-US" smtClean="0"/>
-              <a:t>12/6/18</a:t>
+              <a:t>12/7/2018</a:t>
             </a:fld>
             <a:endParaRPr lang="en-US"/>
           </a:p>
@@ -1244,7 +1244,7 @@
           <a:p>
             <a:fld id="{1ED510AF-F9B4-4E1A-954B-380C51C6E72A}" type="datetimeFigureOut">
               <a:rPr lang="en-US" smtClean="0"/>
-              <a:t>12/6/18</a:t>
+              <a:t>12/7/2018</a:t>
             </a:fld>
             <a:endParaRPr lang="en-US"/>
           </a:p>
@@ -1611,7 +1611,7 @@
           <a:p>
             <a:fld id="{1ED510AF-F9B4-4E1A-954B-380C51C6E72A}" type="datetimeFigureOut">
               <a:rPr lang="en-US" smtClean="0"/>
-              <a:t>12/6/18</a:t>
+              <a:t>12/7/2018</a:t>
             </a:fld>
             <a:endParaRPr lang="en-US"/>
           </a:p>
@@ -1729,7 +1729,7 @@
           <a:p>
             <a:fld id="{1ED510AF-F9B4-4E1A-954B-380C51C6E72A}" type="datetimeFigureOut">
               <a:rPr lang="en-US" smtClean="0"/>
-              <a:t>12/6/18</a:t>
+              <a:t>12/7/2018</a:t>
             </a:fld>
             <a:endParaRPr lang="en-US"/>
           </a:p>
@@ -1824,7 +1824,7 @@
           <a:p>
             <a:fld id="{1ED510AF-F9B4-4E1A-954B-380C51C6E72A}" type="datetimeFigureOut">
               <a:rPr lang="en-US" smtClean="0"/>
-              <a:t>12/6/18</a:t>
+              <a:t>12/7/2018</a:t>
             </a:fld>
             <a:endParaRPr lang="en-US"/>
           </a:p>
@@ -2101,7 +2101,7 @@
           <a:p>
             <a:fld id="{1ED510AF-F9B4-4E1A-954B-380C51C6E72A}" type="datetimeFigureOut">
               <a:rPr lang="en-US" smtClean="0"/>
-              <a:t>12/6/18</a:t>
+              <a:t>12/7/2018</a:t>
             </a:fld>
             <a:endParaRPr lang="en-US"/>
           </a:p>
@@ -2358,7 +2358,7 @@
           <a:p>
             <a:fld id="{1ED510AF-F9B4-4E1A-954B-380C51C6E72A}" type="datetimeFigureOut">
               <a:rPr lang="en-US" smtClean="0"/>
-              <a:t>12/6/18</a:t>
+              <a:t>12/7/2018</a:t>
             </a:fld>
             <a:endParaRPr lang="en-US"/>
           </a:p>
@@ -2571,7 +2571,7 @@
           <a:p>
             <a:fld id="{1ED510AF-F9B4-4E1A-954B-380C51C6E72A}" type="datetimeFigureOut">
               <a:rPr lang="en-US" smtClean="0"/>
-              <a:t>12/6/18</a:t>
+              <a:t>12/7/2018</a:t>
             </a:fld>
             <a:endParaRPr lang="en-US"/>
           </a:p>
@@ -4592,7 +4592,7 @@
           <p:cNvPr id="6" name="Picture 5">
             <a:extLst>
               <a:ext uri="{FF2B5EF4-FFF2-40B4-BE49-F238E27FC236}">
-                <a16:creationId xmlns:a16="http://schemas.microsoft.com/office/drawing/2014/main" id="{BAA572EA-8D07-3F48-A720-87D3B4129856}"/>
+                <a16:creationId xmlns:a16="http://schemas.microsoft.com/office/drawing/2014/main" xmlns="" id="{BAA572EA-8D07-3F48-A720-87D3B4129856}"/>
               </a:ext>
             </a:extLst>
           </p:cNvPr>

</xml_diff>